<commit_message>
Updated title slide to correct details.
</commit_message>
<xml_diff>
--- a/presentations/2022-11-Webinars/FHIR-Terminology-Part-3-2022-12-01.pptx
+++ b/presentations/2022-11-Webinars/FHIR-Terminology-Part-3-2022-12-01.pptx
@@ -9403,7 +9403,7 @@
             </a:br>
             <a:r>
               <a:rPr lang="en-US" dirty="0"/>
-              <a:t>Part 2 – Searching and Services</a:t>
+              <a:t>Part 3 – Further (Advanced) Topics</a:t>
             </a:r>
           </a:p>
           <a:p>
@@ -9474,7 +9474,7 @@
           <a:p>
             <a:r>
               <a:rPr lang="en-US" dirty="0"/>
-              <a:t>2022-11-30</a:t>
+              <a:t>2022-12-01</a:t>
             </a:r>
           </a:p>
           <a:p>
@@ -10348,7 +10348,7 @@
           <p:nvPr>
             <p:extLst>
               <p:ext uri="{D42A27DB-BD31-4B8C-83A1-F6EECF244321}">
-                <p14:modId xmlns:p14="http://schemas.microsoft.com/office/powerpoint/2010/main" val="353636172"/>
+                <p14:modId xmlns:p14="http://schemas.microsoft.com/office/powerpoint/2010/main" val="1503383080"/>
               </p:ext>
             </p:extLst>
           </p:nvPr>

</xml_diff>